<commit_message>
changes from dry run
</commit_message>
<xml_diff>
--- a/instructors/Being_FAIR_Episode.pptx
+++ b/instructors/Being_FAIR_Episode.pptx
@@ -3428,6 +3428,13 @@
   <p:clrMapOvr>
     <a:masterClrMapping/>
   </p:clrMapOvr>
+  <p:timing>
+    <p:tnLst>
+      <p:par>
+        <p:cTn id="1" dur="indefinite" restart="never" nodeType="tmRoot"/>
+      </p:par>
+    </p:tnLst>
+  </p:timing>
 </p:sld>
 </file>
 
@@ -3556,11 +3563,6 @@
               </a:rPr>
               <a:t>10.1038/sdata.2016.18</a:t>
             </a:r>
-            <a:endParaRPr lang="en-GB" dirty="0">
-              <a:solidFill>
-                <a:srgbClr val="7030A0"/>
-              </a:solidFill>
-            </a:endParaRPr>
           </a:p>
           <a:p>
             <a:endParaRPr lang="en-GB" dirty="0"/>
@@ -3577,6 +3579,13 @@
   <p:clrMapOvr>
     <a:masterClrMapping/>
   </p:clrMapOvr>
+  <p:timing>
+    <p:tnLst>
+      <p:par>
+        <p:cTn id="1" dur="indefinite" restart="never" nodeType="tmRoot"/>
+      </p:par>
+    </p:tnLst>
+  </p:timing>
 </p:sld>
 </file>
 
@@ -3769,6 +3778,13 @@
   <p:clrMapOvr>
     <a:masterClrMapping/>
   </p:clrMapOvr>
+  <p:timing>
+    <p:tnLst>
+      <p:par>
+        <p:cTn id="1" dur="indefinite" restart="never" nodeType="tmRoot"/>
+      </p:par>
+    </p:tnLst>
+  </p:timing>
 </p:sld>
 </file>
 
@@ -3936,6 +3952,13 @@
   <p:clrMapOvr>
     <a:masterClrMapping/>
   </p:clrMapOvr>
+  <p:timing>
+    <p:tnLst>
+      <p:par>
+        <p:cTn id="1" dur="indefinite" restart="never" nodeType="tmRoot"/>
+      </p:par>
+    </p:tnLst>
+  </p:timing>
 </p:sld>
 </file>
 
@@ -4930,6 +4953,13 @@
   <p:clrMapOvr>
     <a:masterClrMapping/>
   </p:clrMapOvr>
+  <p:timing>
+    <p:tnLst>
+      <p:par>
+        <p:cTn id="1" dur="indefinite" restart="never" nodeType="tmRoot"/>
+      </p:par>
+    </p:tnLst>
+  </p:timing>
 </p:sld>
 </file>
 
@@ -5054,6 +5084,13 @@
   <p:clrMapOvr>
     <a:masterClrMapping/>
   </p:clrMapOvr>
+  <p:timing>
+    <p:tnLst>
+      <p:par>
+        <p:cTn id="1" dur="indefinite" restart="never" nodeType="tmRoot"/>
+      </p:par>
+    </p:tnLst>
+  </p:timing>
 </p:sld>
 </file>
 
@@ -5143,6 +5180,13 @@
   <p:clrMapOvr>
     <a:masterClrMapping/>
   </p:clrMapOvr>
+  <p:timing>
+    <p:tnLst>
+      <p:par>
+        <p:cTn id="1" dur="indefinite" restart="never" nodeType="tmRoot"/>
+      </p:par>
+    </p:tnLst>
+  </p:timing>
 </p:sld>
 </file>
 
@@ -5259,6 +5303,13 @@
   <p:clrMapOvr>
     <a:masterClrMapping/>
   </p:clrMapOvr>
+  <p:timing>
+    <p:tnLst>
+      <p:par>
+        <p:cTn id="1" dur="indefinite" restart="never" nodeType="tmRoot"/>
+      </p:par>
+    </p:tnLst>
+  </p:timing>
 </p:sld>
 </file>
 
@@ -5348,6 +5399,13 @@
   <p:clrMapOvr>
     <a:masterClrMapping/>
   </p:clrMapOvr>
+  <p:timing>
+    <p:tnLst>
+      <p:par>
+        <p:cTn id="1" dur="indefinite" restart="never" nodeType="tmRoot"/>
+      </p:par>
+    </p:tnLst>
+  </p:timing>
 </p:sld>
 </file>
 
@@ -5441,6 +5499,13 @@
   <p:clrMapOvr>
     <a:masterClrMapping/>
   </p:clrMapOvr>
+  <p:timing>
+    <p:tnLst>
+      <p:par>
+        <p:cTn id="1" dur="indefinite" restart="never" nodeType="tmRoot"/>
+      </p:par>
+    </p:tnLst>
+  </p:timing>
 </p:sld>
 </file>
 
@@ -5570,6 +5635,13 @@
   <p:clrMapOvr>
     <a:masterClrMapping/>
   </p:clrMapOvr>
+  <p:timing>
+    <p:tnLst>
+      <p:par>
+        <p:cTn id="1" dur="indefinite" restart="never" nodeType="tmRoot"/>
+      </p:par>
+    </p:tnLst>
+  </p:timing>
 </p:sld>
 </file>
 
@@ -5723,6 +5795,13 @@
   <p:clrMapOvr>
     <a:masterClrMapping/>
   </p:clrMapOvr>
+  <p:timing>
+    <p:tnLst>
+      <p:par>
+        <p:cTn id="1" dur="indefinite" restart="never" nodeType="tmRoot"/>
+      </p:par>
+    </p:tnLst>
+  </p:timing>
 </p:sld>
 </file>
 
@@ -5863,6 +5942,13 @@
   <p:clrMapOvr>
     <a:masterClrMapping/>
   </p:clrMapOvr>
+  <p:timing>
+    <p:tnLst>
+      <p:par>
+        <p:cTn id="1" dur="indefinite" restart="never" nodeType="tmRoot"/>
+      </p:par>
+    </p:tnLst>
+  </p:timing>
 </p:sld>
 </file>
 
@@ -5998,6 +6084,13 @@
   <p:clrMapOvr>
     <a:masterClrMapping/>
   </p:clrMapOvr>
+  <p:timing>
+    <p:tnLst>
+      <p:par>
+        <p:cTn id="1" dur="indefinite" restart="never" nodeType="tmRoot"/>
+      </p:par>
+    </p:tnLst>
+  </p:timing>
 </p:sld>
 </file>
 
@@ -6204,6 +6297,13 @@
   <p:clrMapOvr>
     <a:masterClrMapping/>
   </p:clrMapOvr>
+  <p:timing>
+    <p:tnLst>
+      <p:par>
+        <p:cTn id="1" dur="indefinite" restart="never" nodeType="tmRoot"/>
+      </p:par>
+    </p:tnLst>
+  </p:timing>
 </p:sld>
 </file>
 

</xml_diff>

<commit_message>
proof reading of notebooks and pptx, episode 04 and 05 notebook
</commit_message>
<xml_diff>
--- a/instructors/Being_FAIR_Episode.pptx
+++ b/instructors/Being_FAIR_Episode.pptx
@@ -279,7 +279,7 @@
           <a:p>
             <a:fld id="{DE72BEAC-A25F-4480-8AFC-1D3E290F2CC8}" type="datetimeFigureOut">
               <a:rPr lang="en-GB" smtClean="0"/>
-              <a:t>20/05/2021</a:t>
+              <a:t>09/06/2021</a:t>
             </a:fld>
             <a:endParaRPr lang="en-GB"/>
           </a:p>
@@ -479,7 +479,7 @@
           <a:p>
             <a:fld id="{DE72BEAC-A25F-4480-8AFC-1D3E290F2CC8}" type="datetimeFigureOut">
               <a:rPr lang="en-GB" smtClean="0"/>
-              <a:t>20/05/2021</a:t>
+              <a:t>09/06/2021</a:t>
             </a:fld>
             <a:endParaRPr lang="en-GB"/>
           </a:p>
@@ -689,7 +689,7 @@
           <a:p>
             <a:fld id="{DE72BEAC-A25F-4480-8AFC-1D3E290F2CC8}" type="datetimeFigureOut">
               <a:rPr lang="en-GB" smtClean="0"/>
-              <a:t>20/05/2021</a:t>
+              <a:t>09/06/2021</a:t>
             </a:fld>
             <a:endParaRPr lang="en-GB"/>
           </a:p>
@@ -889,7 +889,7 @@
           <a:p>
             <a:fld id="{DE72BEAC-A25F-4480-8AFC-1D3E290F2CC8}" type="datetimeFigureOut">
               <a:rPr lang="en-GB" smtClean="0"/>
-              <a:t>20/05/2021</a:t>
+              <a:t>09/06/2021</a:t>
             </a:fld>
             <a:endParaRPr lang="en-GB"/>
           </a:p>
@@ -1165,7 +1165,7 @@
           <a:p>
             <a:fld id="{DE72BEAC-A25F-4480-8AFC-1D3E290F2CC8}" type="datetimeFigureOut">
               <a:rPr lang="en-GB" smtClean="0"/>
-              <a:t>20/05/2021</a:t>
+              <a:t>09/06/2021</a:t>
             </a:fld>
             <a:endParaRPr lang="en-GB"/>
           </a:p>
@@ -1433,7 +1433,7 @@
           <a:p>
             <a:fld id="{DE72BEAC-A25F-4480-8AFC-1D3E290F2CC8}" type="datetimeFigureOut">
               <a:rPr lang="en-GB" smtClean="0"/>
-              <a:t>20/05/2021</a:t>
+              <a:t>09/06/2021</a:t>
             </a:fld>
             <a:endParaRPr lang="en-GB"/>
           </a:p>
@@ -1848,7 +1848,7 @@
           <a:p>
             <a:fld id="{DE72BEAC-A25F-4480-8AFC-1D3E290F2CC8}" type="datetimeFigureOut">
               <a:rPr lang="en-GB" smtClean="0"/>
-              <a:t>20/05/2021</a:t>
+              <a:t>09/06/2021</a:t>
             </a:fld>
             <a:endParaRPr lang="en-GB"/>
           </a:p>
@@ -1990,7 +1990,7 @@
           <a:p>
             <a:fld id="{DE72BEAC-A25F-4480-8AFC-1D3E290F2CC8}" type="datetimeFigureOut">
               <a:rPr lang="en-GB" smtClean="0"/>
-              <a:t>20/05/2021</a:t>
+              <a:t>09/06/2021</a:t>
             </a:fld>
             <a:endParaRPr lang="en-GB"/>
           </a:p>
@@ -2103,7 +2103,7 @@
           <a:p>
             <a:fld id="{DE72BEAC-A25F-4480-8AFC-1D3E290F2CC8}" type="datetimeFigureOut">
               <a:rPr lang="en-GB" smtClean="0"/>
-              <a:t>20/05/2021</a:t>
+              <a:t>09/06/2021</a:t>
             </a:fld>
             <a:endParaRPr lang="en-GB"/>
           </a:p>
@@ -2416,7 +2416,7 @@
           <a:p>
             <a:fld id="{DE72BEAC-A25F-4480-8AFC-1D3E290F2CC8}" type="datetimeFigureOut">
               <a:rPr lang="en-GB" smtClean="0"/>
-              <a:t>20/05/2021</a:t>
+              <a:t>09/06/2021</a:t>
             </a:fld>
             <a:endParaRPr lang="en-GB"/>
           </a:p>
@@ -2705,7 +2705,7 @@
           <a:p>
             <a:fld id="{DE72BEAC-A25F-4480-8AFC-1D3E290F2CC8}" type="datetimeFigureOut">
               <a:rPr lang="en-GB" smtClean="0"/>
-              <a:t>20/05/2021</a:t>
+              <a:t>09/06/2021</a:t>
             </a:fld>
             <a:endParaRPr lang="en-GB"/>
           </a:p>
@@ -2948,7 +2948,7 @@
           <a:p>
             <a:fld id="{DE72BEAC-A25F-4480-8AFC-1D3E290F2CC8}" type="datetimeFigureOut">
               <a:rPr lang="en-GB" smtClean="0"/>
-              <a:t>20/05/2021</a:t>
+              <a:t>09/06/2021</a:t>
             </a:fld>
             <a:endParaRPr lang="en-GB"/>
           </a:p>
@@ -3428,13 +3428,6 @@
   <p:clrMapOvr>
     <a:masterClrMapping/>
   </p:clrMapOvr>
-  <p:timing>
-    <p:tnLst>
-      <p:par>
-        <p:cTn id="1" dur="indefinite" restart="never" nodeType="tmRoot"/>
-      </p:par>
-    </p:tnLst>
-  </p:timing>
 </p:sld>
 </file>
 
@@ -3524,13 +3517,9 @@
           <a:p>
             <a:r>
               <a:rPr lang="en-GB" dirty="0"/>
-              <a:t>and a unique identifier (that distinguishes the resource or concept from others</a:t>
-            </a:r>
-            <a:r>
-              <a:rPr lang="en-GB" dirty="0" smtClean="0"/>
-              <a:t>).</a:t>
-            </a:r>
-            <a:endParaRPr lang="pl-PL" dirty="0" smtClean="0"/>
+              <a:t>and a unique identifier (that distinguishes the resource or concept from others).</a:t>
+            </a:r>
+            <a:endParaRPr lang="pl-PL" dirty="0"/>
           </a:p>
           <a:p>
             <a:endParaRPr lang="pl-PL" dirty="0"/>
@@ -3579,13 +3568,6 @@
   <p:clrMapOvr>
     <a:masterClrMapping/>
   </p:clrMapOvr>
-  <p:timing>
-    <p:tnLst>
-      <p:par>
-        <p:cTn id="1" dur="indefinite" restart="never" nodeType="tmRoot"/>
-      </p:par>
-    </p:tnLst>
-  </p:timing>
 </p:sld>
 </file>
 
@@ -3778,13 +3760,6 @@
   <p:clrMapOvr>
     <a:masterClrMapping/>
   </p:clrMapOvr>
-  <p:timing>
-    <p:tnLst>
-      <p:par>
-        <p:cTn id="1" dur="indefinite" restart="never" nodeType="tmRoot"/>
-      </p:par>
-    </p:tnLst>
-  </p:timing>
 </p:sld>
 </file>
 
@@ -3870,16 +3845,12 @@
           </a:p>
           <a:p>
             <a:r>
-              <a:rPr lang="pl-PL" dirty="0" smtClean="0"/>
+              <a:rPr lang="pl-PL" dirty="0"/>
               <a:t>U</a:t>
             </a:r>
             <a:r>
-              <a:rPr lang="en-GB" dirty="0" smtClean="0"/>
-              <a:t>se </a:t>
-            </a:r>
-            <a:r>
-              <a:rPr lang="en-GB" dirty="0"/>
-              <a:t>.csv or .</a:t>
+              <a:rPr lang="en-GB" dirty="0"/>
+              <a:t>se .csv or .</a:t>
             </a:r>
             <a:r>
               <a:rPr lang="en-GB" dirty="0" err="1"/>
@@ -3895,7 +3866,7 @@
             </a:r>
             <a:r>
               <a:rPr lang="en-GB" dirty="0"/>
-              <a:t> share data tables as word or pdf,</a:t>
+              <a:t> share data tables as word or pdf</a:t>
             </a:r>
           </a:p>
           <a:p>
@@ -3907,7 +3878,7 @@
           <a:p>
             <a:r>
               <a:rPr lang="en-GB" dirty="0"/>
-              <a:t>Convert proprietary binary formats to the open ones. For example convert </a:t>
+              <a:t>Convert proprietary binary formats to open ones. For example convert </a:t>
             </a:r>
             <a:r>
               <a:rPr lang="en-GB" dirty="0" err="1"/>
@@ -3952,13 +3923,6 @@
   <p:clrMapOvr>
     <a:masterClrMapping/>
   </p:clrMapOvr>
-  <p:timing>
-    <p:tnLst>
-      <p:par>
-        <p:cTn id="1" dur="indefinite" restart="never" nodeType="tmRoot"/>
-      </p:par>
-    </p:tnLst>
-  </p:timing>
 </p:sld>
 </file>
 
@@ -4061,7 +4025,7 @@
           <a:p>
             <a:r>
               <a:rPr lang="en-GB" dirty="0"/>
-              <a:t>write README file describing the data</a:t>
+              <a:t>write a README file describing the data</a:t>
             </a:r>
           </a:p>
           <a:p>
@@ -4118,13 +4082,6 @@
   <p:clrMapOvr>
     <a:masterClrMapping/>
   </p:clrMapOvr>
-  <p:timing>
-    <p:tnLst>
-      <p:par>
-        <p:cTn id="1" dur="indefinite" restart="never" nodeType="tmRoot"/>
-      </p:par>
-    </p:tnLst>
-  </p:timing>
 </p:sld>
 </file>
 
@@ -4297,13 +4254,6 @@
   <p:clrMapOvr>
     <a:masterClrMapping/>
   </p:clrMapOvr>
-  <p:timing>
-    <p:tnLst>
-      <p:par>
-        <p:cTn id="1" dur="indefinite" restart="never" nodeType="tmRoot"/>
-      </p:par>
-    </p:tnLst>
-  </p:timing>
 </p:sld>
 </file>
 
@@ -4346,23 +4296,19 @@
           <a:lstStyle/>
           <a:p>
             <a:r>
-              <a:rPr lang="pl-PL" dirty="0" smtClean="0"/>
+              <a:rPr lang="pl-PL" dirty="0"/>
               <a:t>Licence, </a:t>
             </a:r>
             <a:r>
-              <a:rPr lang="en-GB" dirty="0" smtClean="0"/>
-              <a:t>Copyright </a:t>
-            </a:r>
-            <a:r>
-              <a:rPr lang="en-GB" dirty="0"/>
-              <a:t>and </a:t>
-            </a:r>
-            <a:r>
-              <a:rPr lang="pl-PL" dirty="0" smtClean="0"/>
+              <a:rPr lang="en-GB" dirty="0"/>
+              <a:t>Copyright and </a:t>
+            </a:r>
+            <a:r>
+              <a:rPr lang="pl-PL" dirty="0"/>
               <a:t>D</a:t>
             </a:r>
             <a:r>
-              <a:rPr lang="en-GB" dirty="0" err="1" smtClean="0"/>
+              <a:rPr lang="en-GB" dirty="0" err="1"/>
               <a:t>ata</a:t>
             </a:r>
             <a:endParaRPr lang="en-GB" dirty="0"/>
@@ -4401,67 +4347,47 @@
               <a:rPr lang="en-GB" dirty="0"/>
               <a:t>Software code (the text) gets by default copyright protection which prevents others from copying or modifying it. </a:t>
             </a:r>
-            <a:r>
-              <a:rPr lang="pl-PL" dirty="0"/>
-              <a:t/>
-            </a:r>
             <a:br>
               <a:rPr lang="pl-PL" dirty="0"/>
             </a:br>
             <a:r>
-              <a:rPr lang="pl-PL" dirty="0" smtClean="0"/>
+              <a:rPr lang="pl-PL" dirty="0"/>
               <a:t>Adding an</a:t>
             </a:r>
             <a:r>
-              <a:rPr lang="en-GB" dirty="0" smtClean="0"/>
-              <a:t> </a:t>
-            </a:r>
-            <a:r>
-              <a:rPr lang="en-GB" dirty="0"/>
-              <a:t>explicit licence is needed to permit re-use.</a:t>
-            </a:r>
-          </a:p>
-          <a:p>
-            <a:endParaRPr lang="pl-PL" dirty="0" smtClean="0"/>
-          </a:p>
-          <a:p>
-            <a:r>
-              <a:rPr lang="en-GB" dirty="0" smtClean="0"/>
-              <a:t>Data</a:t>
-            </a:r>
-            <a:r>
-              <a:rPr lang="en-GB" dirty="0"/>
-              <a:t>, being factual, cannot be copyrighted. </a:t>
-            </a:r>
-          </a:p>
-          <a:p>
-            <a:endParaRPr lang="pl-PL" dirty="0" smtClean="0"/>
-          </a:p>
-          <a:p>
-            <a:r>
-              <a:rPr lang="en-GB" dirty="0" smtClean="0"/>
-              <a:t>While </a:t>
-            </a:r>
-            <a:r>
-              <a:rPr lang="en-GB" dirty="0"/>
-              <a:t>the data itself cannot be copyrighted, the way how it is presented can be. The extend of protection is ultimately settled by a court.</a:t>
-            </a:r>
-          </a:p>
-          <a:p>
-            <a:endParaRPr lang="pl-PL" dirty="0" smtClean="0"/>
-          </a:p>
-          <a:p>
-            <a:r>
-              <a:rPr lang="pl-PL" dirty="0" smtClean="0"/>
+              <a:rPr lang="en-GB" dirty="0"/>
+              <a:t> explicit licence is needed to permit re-use.</a:t>
+            </a:r>
+          </a:p>
+          <a:p>
+            <a:endParaRPr lang="pl-PL" dirty="0"/>
+          </a:p>
+          <a:p>
+            <a:r>
+              <a:rPr lang="en-GB" dirty="0"/>
+              <a:t>Data, being factual, cannot be copyrighted. </a:t>
+            </a:r>
+          </a:p>
+          <a:p>
+            <a:endParaRPr lang="pl-PL" dirty="0"/>
+          </a:p>
+          <a:p>
+            <a:r>
+              <a:rPr lang="en-GB" dirty="0"/>
+              <a:t>While the data itself cannot be copyrighted, the way how it is presented can be. The extend of protection is ultimately settled by a court.</a:t>
+            </a:r>
+          </a:p>
+          <a:p>
+            <a:endParaRPr lang="pl-PL" dirty="0"/>
+          </a:p>
+          <a:p>
+            <a:r>
+              <a:rPr lang="pl-PL" dirty="0"/>
               <a:t>Without licence t</a:t>
             </a:r>
             <a:r>
-              <a:rPr lang="en-GB" dirty="0" smtClean="0"/>
-              <a:t>he </a:t>
-            </a:r>
-            <a:r>
-              <a:rPr lang="en-GB" dirty="0"/>
-              <a:t>“good actors” will restrain from using your data to avoid “court” risks. </a:t>
+              <a:rPr lang="en-GB" dirty="0"/>
+              <a:t>he “good actors” will restrain from using your data to avoid “court” risks. </a:t>
             </a:r>
           </a:p>
           <a:p>
@@ -4482,13 +4408,6 @@
   <p:clrMapOvr>
     <a:masterClrMapping/>
   </p:clrMapOvr>
-  <p:timing>
-    <p:tnLst>
-      <p:par>
-        <p:cTn id="1" dur="indefinite" restart="never" nodeType="tmRoot"/>
-      </p:par>
-    </p:tnLst>
-  </p:timing>
 </p:sld>
 </file>
 
@@ -4564,10 +4483,10 @@
               <a:buNone/>
             </a:pPr>
             <a:r>
-              <a:rPr lang="en-GB" dirty="0" smtClean="0"/>
+              <a:rPr lang="en-GB" dirty="0"/>
               <a:t>…</a:t>
             </a:r>
-            <a:endParaRPr lang="pl-PL" dirty="0" smtClean="0"/>
+            <a:endParaRPr lang="pl-PL" dirty="0"/>
           </a:p>
           <a:p>
             <a:pPr marL="0" indent="0">
@@ -4579,13 +4498,13 @@
             <a:pPr marL="0" indent="0">
               <a:buNone/>
             </a:pPr>
-            <a:endParaRPr lang="pl-PL" dirty="0" smtClean="0"/>
+            <a:endParaRPr lang="pl-PL" dirty="0"/>
           </a:p>
           <a:p>
             <a:pPr marL="0" indent="0">
               <a:buNone/>
             </a:pPr>
-            <a:endParaRPr lang="pl-PL" dirty="0" smtClean="0"/>
+            <a:endParaRPr lang="pl-PL" dirty="0"/>
           </a:p>
           <a:p>
             <a:pPr marL="0" indent="0">
@@ -4607,15 +4526,9 @@
               <a:rPr lang="en-GB" dirty="0">
                 <a:hlinkClick r:id="rId2"/>
               </a:rPr>
-              <a:t>https://</a:t>
-            </a:r>
-            <a:r>
-              <a:rPr lang="en-GB" dirty="0" smtClean="0">
-                <a:hlinkClick r:id="rId2"/>
-              </a:rPr>
-              <a:t>synbiohub.org/public/bsu/SubtilinReceiver_spaRK_separated/1</a:t>
-            </a:r>
-            <a:endParaRPr lang="pl-PL" dirty="0" smtClean="0"/>
+              <a:t>https://synbiohub.org/public/bsu/SubtilinReceiver_spaRK_separated/1</a:t>
+            </a:r>
+            <a:endParaRPr lang="pl-PL" dirty="0"/>
           </a:p>
           <a:p>
             <a:pPr marL="0" indent="0">
@@ -4635,13 +4548,6 @@
   <p:clrMapOvr>
     <a:masterClrMapping/>
   </p:clrMapOvr>
-  <p:timing>
-    <p:tnLst>
-      <p:par>
-        <p:cTn id="1" dur="indefinite" restart="never" nodeType="tmRoot"/>
-      </p:par>
-    </p:tnLst>
-  </p:timing>
 </p:sld>
 </file>
 
@@ -4953,13 +4859,6 @@
   <p:clrMapOvr>
     <a:masterClrMapping/>
   </p:clrMapOvr>
-  <p:timing>
-    <p:tnLst>
-      <p:par>
-        <p:cTn id="1" dur="indefinite" restart="never" nodeType="tmRoot"/>
-      </p:par>
-    </p:tnLst>
-  </p:timing>
 </p:sld>
 </file>
 
@@ -5084,13 +4983,6 @@
   <p:clrMapOvr>
     <a:masterClrMapping/>
   </p:clrMapOvr>
-  <p:timing>
-    <p:tnLst>
-      <p:par>
-        <p:cTn id="1" dur="indefinite" restart="never" nodeType="tmRoot"/>
-      </p:par>
-    </p:tnLst>
-  </p:timing>
 </p:sld>
 </file>
 
@@ -5180,13 +5072,6 @@
   <p:clrMapOvr>
     <a:masterClrMapping/>
   </p:clrMapOvr>
-  <p:timing>
-    <p:tnLst>
-      <p:par>
-        <p:cTn id="1" dur="indefinite" restart="never" nodeType="tmRoot"/>
-      </p:par>
-    </p:tnLst>
-  </p:timing>
 </p:sld>
 </file>
 
@@ -5261,7 +5146,7 @@
             </a:pPr>
             <a:r>
               <a:rPr lang="en-GB" dirty="0"/>
-              <a:t>Data does not mean Excel files with recorded measurements from a machine. Data also includes:</a:t>
+              <a:t>Data does not only mean Excel files with recorded measurements from a machine. Data also includes:</a:t>
             </a:r>
           </a:p>
           <a:p>
@@ -5303,13 +5188,6 @@
   <p:clrMapOvr>
     <a:masterClrMapping/>
   </p:clrMapOvr>
-  <p:timing>
-    <p:tnLst>
-      <p:par>
-        <p:cTn id="1" dur="indefinite" restart="never" nodeType="tmRoot"/>
-      </p:par>
-    </p:tnLst>
-  </p:timing>
 </p:sld>
 </file>
 
@@ -5399,13 +5277,6 @@
   <p:clrMapOvr>
     <a:masterClrMapping/>
   </p:clrMapOvr>
-  <p:timing>
-    <p:tnLst>
-      <p:par>
-        <p:cTn id="1" dur="indefinite" restart="never" nodeType="tmRoot"/>
-      </p:par>
-    </p:tnLst>
-  </p:timing>
 </p:sld>
 </file>
 
@@ -5499,13 +5370,6 @@
   <p:clrMapOvr>
     <a:masterClrMapping/>
   </p:clrMapOvr>
-  <p:timing>
-    <p:tnLst>
-      <p:par>
-        <p:cTn id="1" dur="indefinite" restart="never" nodeType="tmRoot"/>
-      </p:par>
-    </p:tnLst>
-  </p:timing>
 </p:sld>
 </file>
 
@@ -5575,16 +5439,12 @@
           <a:bodyPr/>
           <a:lstStyle/>
           <a:p>
-            <a:endParaRPr lang="pl-PL" dirty="0" smtClean="0"/>
-          </a:p>
-          <a:p>
-            <a:r>
-              <a:rPr lang="en-GB" dirty="0" smtClean="0"/>
-              <a:t>Only </a:t>
-            </a:r>
-            <a:r>
-              <a:rPr lang="en-GB" dirty="0"/>
-              <a:t>averaged data available</a:t>
+            <a:endParaRPr lang="pl-PL" dirty="0"/>
+          </a:p>
+          <a:p>
+            <a:r>
+              <a:rPr lang="en-GB" dirty="0"/>
+              <a:t>Only averaged data available</a:t>
             </a:r>
           </a:p>
           <a:p>
@@ -5596,7 +5456,7 @@
           <a:p>
             <a:r>
               <a:rPr lang="en-GB" dirty="0"/>
-              <a:t>Data tables in PDF files in supporting information</a:t>
+              <a:t>Data tables as PDF files in supporting information</a:t>
             </a:r>
           </a:p>
           <a:p>
@@ -5635,13 +5495,6 @@
   <p:clrMapOvr>
     <a:masterClrMapping/>
   </p:clrMapOvr>
-  <p:timing>
-    <p:tnLst>
-      <p:par>
-        <p:cTn id="1" dur="indefinite" restart="never" nodeType="tmRoot"/>
-      </p:par>
-    </p:tnLst>
-  </p:timing>
 </p:sld>
 </file>
 
@@ -5795,13 +5648,6 @@
   <p:clrMapOvr>
     <a:masterClrMapping/>
   </p:clrMapOvr>
-  <p:timing>
-    <p:tnLst>
-      <p:par>
-        <p:cTn id="1" dur="indefinite" restart="never" nodeType="tmRoot"/>
-      </p:par>
-    </p:tnLst>
-  </p:timing>
 </p:sld>
 </file>
 
@@ -5942,13 +5788,6 @@
   <p:clrMapOvr>
     <a:masterClrMapping/>
   </p:clrMapOvr>
-  <p:timing>
-    <p:tnLst>
-      <p:par>
-        <p:cTn id="1" dur="indefinite" restart="never" nodeType="tmRoot"/>
-      </p:par>
-    </p:tnLst>
-  </p:timing>
 </p:sld>
 </file>
 
@@ -6043,7 +5882,7 @@
             </a:r>
             <a:r>
               <a:rPr lang="en-GB" sz="2000" dirty="0"/>
-              <a:t>: The (meta)data retrievable by their identifier using a standardized and open communications protocol (including authentication and authorisation). Metadata should be available even when the data are no longer available.</a:t>
+              <a:t>: The (meta)data retrievable by their identifier using a standardised and open communications protocol (including authentication and authorisation). Metadata should be available even when the data are no longer available.</a:t>
             </a:r>
           </a:p>
           <a:p>
@@ -6069,7 +5908,7 @@
             </a:r>
             <a:r>
               <a:rPr lang="en-GB" sz="2000" dirty="0"/>
-              <a:t>: FAIR aims at optimizing the reuse of data. Metadata and data should be well-described so that they can be replicated and/or combined in different settings. The reuse of the (meta)data should be stated with clear and accessible license(s)</a:t>
+              <a:t>: FAIR aims at optimising the reuse of data. Metadata and data should be well-described so that they can be replicated and/or combined in different settings. The reuse of the (meta)data should be stated with clear and accessible license(s)</a:t>
             </a:r>
           </a:p>
         </p:txBody>
@@ -6084,13 +5923,6 @@
   <p:clrMapOvr>
     <a:masterClrMapping/>
   </p:clrMapOvr>
-  <p:timing>
-    <p:tnLst>
-      <p:par>
-        <p:cTn id="1" dur="indefinite" restart="never" nodeType="tmRoot"/>
-      </p:par>
-    </p:tnLst>
-  </p:timing>
 </p:sld>
 </file>
 
@@ -6255,14 +6087,14 @@
               <a:t>Or domain specific, for example: </a:t>
             </a:r>
             <a:r>
-              <a:rPr lang="en-GB" sz="2400" dirty="0" err="1">
+              <a:rPr lang="en-GB" sz="2400" dirty="0">
                 <a:hlinkClick r:id="rId6"/>
               </a:rPr>
               <a:t>UniProt</a:t>
             </a:r>
             <a:r>
               <a:rPr lang="en-GB" sz="2400" dirty="0"/>
-              <a:t> protein data, </a:t>
+              <a:t> – protein data, </a:t>
             </a:r>
             <a:r>
               <a:rPr lang="en-GB" sz="2400" dirty="0">
@@ -6272,17 +6104,17 @@
             </a:r>
             <a:r>
               <a:rPr lang="en-GB" sz="2400" dirty="0"/>
-              <a:t> sequence data, </a:t>
-            </a:r>
-            <a:r>
-              <a:rPr lang="en-GB" sz="2400" dirty="0" err="1">
+              <a:t> – sequence data, </a:t>
+            </a:r>
+            <a:r>
+              <a:rPr lang="en-GB" sz="2400" dirty="0">
                 <a:hlinkClick r:id="rId8"/>
               </a:rPr>
               <a:t>MetaboLights</a:t>
             </a:r>
             <a:r>
               <a:rPr lang="en-GB" sz="2400" dirty="0"/>
-              <a:t> metabolomics data.</a:t>
+              <a:t> – metabolomics data.</a:t>
             </a:r>
           </a:p>
         </p:txBody>
@@ -6297,13 +6129,6 @@
   <p:clrMapOvr>
     <a:masterClrMapping/>
   </p:clrMapOvr>
-  <p:timing>
-    <p:tnLst>
-      <p:par>
-        <p:cTn id="1" dur="indefinite" restart="never" nodeType="tmRoot"/>
-      </p:par>
-    </p:tnLst>
-  </p:timing>
 </p:sld>
 </file>
 

</xml_diff>